<commit_message>
Added photos, Updated Presentation, Updated README
</commit_message>
<xml_diff>
--- a/Presentation.pptx
+++ b/Presentation.pptx
@@ -6,6 +6,13 @@
   </p:sldMasterIdLst>
   <p:sldIdLst>
     <p:sldId id="256" r:id="rId2"/>
+    <p:sldId id="257" r:id="rId3"/>
+    <p:sldId id="258" r:id="rId4"/>
+    <p:sldId id="259" r:id="rId5"/>
+    <p:sldId id="260" r:id="rId6"/>
+    <p:sldId id="261" r:id="rId7"/>
+    <p:sldId id="262" r:id="rId8"/>
+    <p:sldId id="263" r:id="rId9"/>
   </p:sldIdLst>
   <p:sldSz cx="12192000" cy="6858000"/>
   <p:notesSz cx="6858000" cy="9144000"/>
@@ -104,7 +111,16 @@
       </a:defRPr>
     </a:lvl9pPr>
   </p:defaultTextStyle>
+  <p:extLst>
+    <p:ext uri="{EFAFB233-063F-42B5-8137-9DF3F51BA10A}">
+      <p15:sldGuideLst xmlns:p15="http://schemas.microsoft.com/office/powerpoint/2012/main"/>
+    </p:ext>
+  </p:extLst>
 </p:presentation>
+</file>
+
+<file path=ppt/revisionInfo.xml><?xml version="1.0" encoding="utf-8"?>
+<p1510:revInfo xmlns:a="http://schemas.openxmlformats.org/drawingml/2006/main" xmlns:r="http://schemas.openxmlformats.org/officeDocument/2006/relationships" xmlns:p1510="http://schemas.microsoft.com/office/powerpoint/2015/10/main"/>
 </file>
 
 <file path=ppt/slideLayouts/slideLayout1.xml><?xml version="1.0" encoding="utf-8"?>
@@ -3390,6 +3406,1899 @@
 </p:sld>
 </file>
 
+<file path=ppt/slides/slide2.xml><?xml version="1.0" encoding="utf-8"?>
+<p:sld xmlns:a="http://schemas.openxmlformats.org/drawingml/2006/main" xmlns:r="http://schemas.openxmlformats.org/officeDocument/2006/relationships" xmlns:p="http://schemas.openxmlformats.org/presentationml/2006/main">
+  <p:cSld>
+    <p:spTree>
+      <p:nvGrpSpPr>
+        <p:cNvPr id="1" name=""/>
+        <p:cNvGrpSpPr/>
+        <p:nvPr/>
+      </p:nvGrpSpPr>
+      <p:grpSpPr>
+        <a:xfrm>
+          <a:off x="0" y="0"/>
+          <a:ext cx="0" cy="0"/>
+          <a:chOff x="0" y="0"/>
+          <a:chExt cx="0" cy="0"/>
+        </a:xfrm>
+      </p:grpSpPr>
+      <p:sp>
+        <p:nvSpPr>
+          <p:cNvPr id="2" name="Title 1">
+            <a:extLst>
+              <a:ext uri="{FF2B5EF4-FFF2-40B4-BE49-F238E27FC236}">
+                <a16:creationId xmlns:a16="http://schemas.microsoft.com/office/drawing/2014/main" id="{5C6B443F-E783-4776-969F-19BCE208E7FF}"/>
+              </a:ext>
+            </a:extLst>
+          </p:cNvPr>
+          <p:cNvSpPr>
+            <a:spLocks noGrp="1"/>
+          </p:cNvSpPr>
+          <p:nvPr>
+            <p:ph type="title"/>
+          </p:nvPr>
+        </p:nvSpPr>
+        <p:spPr/>
+        <p:txBody>
+          <a:bodyPr/>
+          <a:lstStyle/>
+          <a:p>
+            <a:pPr algn="ctr"/>
+            <a:r>
+              <a:rPr lang="en-US" b="1" dirty="0"/>
+              <a:t>Objectives</a:t>
+            </a:r>
+          </a:p>
+        </p:txBody>
+      </p:sp>
+      <p:sp>
+        <p:nvSpPr>
+          <p:cNvPr id="3" name="Content Placeholder 2">
+            <a:extLst>
+              <a:ext uri="{FF2B5EF4-FFF2-40B4-BE49-F238E27FC236}">
+                <a16:creationId xmlns:a16="http://schemas.microsoft.com/office/drawing/2014/main" id="{9B8D0C45-518D-4B3F-8567-36CA58C5DF3B}"/>
+              </a:ext>
+            </a:extLst>
+          </p:cNvPr>
+          <p:cNvSpPr>
+            <a:spLocks noGrp="1"/>
+          </p:cNvSpPr>
+          <p:nvPr>
+            <p:ph idx="1"/>
+          </p:nvPr>
+        </p:nvSpPr>
+        <p:spPr/>
+        <p:txBody>
+          <a:bodyPr/>
+          <a:lstStyle/>
+          <a:p>
+            <a:pPr marL="514350" indent="-514350" algn="ctr">
+              <a:buFont typeface="+mj-lt"/>
+              <a:buAutoNum type="arabicPeriod"/>
+            </a:pPr>
+            <a:r>
+              <a:rPr lang="en-US" dirty="0"/>
+              <a:t>Detect motion at users door</a:t>
+            </a:r>
+          </a:p>
+          <a:p>
+            <a:pPr marL="514350" indent="-514350" algn="ctr">
+              <a:buFont typeface="+mj-lt"/>
+              <a:buAutoNum type="arabicPeriod"/>
+            </a:pPr>
+            <a:r>
+              <a:rPr lang="en-US" dirty="0"/>
+              <a:t>Send request to server using RESTful</a:t>
+            </a:r>
+          </a:p>
+          <a:p>
+            <a:pPr marL="514350" indent="-514350" algn="ctr">
+              <a:buFont typeface="+mj-lt"/>
+              <a:buAutoNum type="arabicPeriod"/>
+            </a:pPr>
+            <a:r>
+              <a:rPr lang="en-US" dirty="0"/>
+              <a:t>Server sends a text message to user</a:t>
+            </a:r>
+          </a:p>
+        </p:txBody>
+      </p:sp>
+    </p:spTree>
+    <p:extLst>
+      <p:ext uri="{BB962C8B-B14F-4D97-AF65-F5344CB8AC3E}">
+        <p14:creationId xmlns:p14="http://schemas.microsoft.com/office/powerpoint/2010/main" val="3964463406"/>
+      </p:ext>
+    </p:extLst>
+  </p:cSld>
+  <p:clrMapOvr>
+    <a:masterClrMapping/>
+  </p:clrMapOvr>
+</p:sld>
+</file>
+
+<file path=ppt/slides/slide3.xml><?xml version="1.0" encoding="utf-8"?>
+<p:sld xmlns:a="http://schemas.openxmlformats.org/drawingml/2006/main" xmlns:r="http://schemas.openxmlformats.org/officeDocument/2006/relationships" xmlns:p="http://schemas.openxmlformats.org/presentationml/2006/main">
+  <p:cSld>
+    <p:spTree>
+      <p:nvGrpSpPr>
+        <p:cNvPr id="1" name=""/>
+        <p:cNvGrpSpPr/>
+        <p:nvPr/>
+      </p:nvGrpSpPr>
+      <p:grpSpPr>
+        <a:xfrm>
+          <a:off x="0" y="0"/>
+          <a:ext cx="0" cy="0"/>
+          <a:chOff x="0" y="0"/>
+          <a:chExt cx="0" cy="0"/>
+        </a:xfrm>
+      </p:grpSpPr>
+      <p:sp>
+        <p:nvSpPr>
+          <p:cNvPr id="2" name="Title 1">
+            <a:extLst>
+              <a:ext uri="{FF2B5EF4-FFF2-40B4-BE49-F238E27FC236}">
+                <a16:creationId xmlns:a16="http://schemas.microsoft.com/office/drawing/2014/main" id="{5DCD2AC6-29C5-453B-9FD8-00A5271424AB}"/>
+              </a:ext>
+            </a:extLst>
+          </p:cNvPr>
+          <p:cNvSpPr>
+            <a:spLocks noGrp="1"/>
+          </p:cNvSpPr>
+          <p:nvPr>
+            <p:ph type="title"/>
+          </p:nvPr>
+        </p:nvSpPr>
+        <p:spPr/>
+        <p:txBody>
+          <a:bodyPr/>
+          <a:lstStyle/>
+          <a:p>
+            <a:pPr algn="ctr"/>
+            <a:r>
+              <a:rPr lang="en-US" b="1" dirty="0"/>
+              <a:t>Detect Motion at Users Door</a:t>
+            </a:r>
+          </a:p>
+        </p:txBody>
+      </p:sp>
+      <p:sp>
+        <p:nvSpPr>
+          <p:cNvPr id="3" name="Content Placeholder 2">
+            <a:extLst>
+              <a:ext uri="{FF2B5EF4-FFF2-40B4-BE49-F238E27FC236}">
+                <a16:creationId xmlns:a16="http://schemas.microsoft.com/office/drawing/2014/main" id="{5E6BB5DA-CE79-44F0-B307-9642F34302A2}"/>
+              </a:ext>
+            </a:extLst>
+          </p:cNvPr>
+          <p:cNvSpPr>
+            <a:spLocks noGrp="1"/>
+          </p:cNvSpPr>
+          <p:nvPr>
+            <p:ph idx="1"/>
+          </p:nvPr>
+        </p:nvSpPr>
+        <p:spPr/>
+        <p:txBody>
+          <a:bodyPr/>
+          <a:lstStyle/>
+          <a:p>
+            <a:r>
+              <a:rPr lang="en-US" dirty="0"/>
+              <a:t>Note: Was not at my door, but would be easy to move the system. This was for face recognition demonstration purposes</a:t>
+            </a:r>
+          </a:p>
+        </p:txBody>
+      </p:sp>
+      <p:pic>
+        <p:nvPicPr>
+          <p:cNvPr id="5" name="Picture 4">
+            <a:extLst>
+              <a:ext uri="{FF2B5EF4-FFF2-40B4-BE49-F238E27FC236}">
+                <a16:creationId xmlns:a16="http://schemas.microsoft.com/office/drawing/2014/main" id="{928C9FDD-08AC-4540-974B-804B3D60DE7F}"/>
+              </a:ext>
+            </a:extLst>
+          </p:cNvPr>
+          <p:cNvPicPr>
+            <a:picLocks noChangeAspect="1"/>
+          </p:cNvPicPr>
+          <p:nvPr/>
+        </p:nvPicPr>
+        <p:blipFill>
+          <a:blip r:embed="rId2">
+            <a:extLst>
+              <a:ext uri="{28A0092B-C50C-407E-A947-70E740481C1C}">
+                <a14:useLocalDpi xmlns:a14="http://schemas.microsoft.com/office/drawing/2010/main" val="0"/>
+              </a:ext>
+            </a:extLst>
+          </a:blip>
+          <a:stretch>
+            <a:fillRect/>
+          </a:stretch>
+        </p:blipFill>
+        <p:spPr>
+          <a:xfrm>
+            <a:off x="2079320" y="2645683"/>
+            <a:ext cx="7640877" cy="4122052"/>
+          </a:xfrm>
+          <a:prstGeom prst="rect">
+            <a:avLst/>
+          </a:prstGeom>
+        </p:spPr>
+      </p:pic>
+    </p:spTree>
+    <p:extLst>
+      <p:ext uri="{BB962C8B-B14F-4D97-AF65-F5344CB8AC3E}">
+        <p14:creationId xmlns:p14="http://schemas.microsoft.com/office/powerpoint/2010/main" val="251507975"/>
+      </p:ext>
+    </p:extLst>
+  </p:cSld>
+  <p:clrMapOvr>
+    <a:masterClrMapping/>
+  </p:clrMapOvr>
+</p:sld>
+</file>
+
+<file path=ppt/slides/slide4.xml><?xml version="1.0" encoding="utf-8"?>
+<p:sld xmlns:a="http://schemas.openxmlformats.org/drawingml/2006/main" xmlns:r="http://schemas.openxmlformats.org/officeDocument/2006/relationships" xmlns:p="http://schemas.openxmlformats.org/presentationml/2006/main">
+  <p:cSld>
+    <p:spTree>
+      <p:nvGrpSpPr>
+        <p:cNvPr id="1" name=""/>
+        <p:cNvGrpSpPr/>
+        <p:nvPr/>
+      </p:nvGrpSpPr>
+      <p:grpSpPr>
+        <a:xfrm>
+          <a:off x="0" y="0"/>
+          <a:ext cx="0" cy="0"/>
+          <a:chOff x="0" y="0"/>
+          <a:chExt cx="0" cy="0"/>
+        </a:xfrm>
+      </p:grpSpPr>
+      <p:sp>
+        <p:nvSpPr>
+          <p:cNvPr id="2" name="Title 1">
+            <a:extLst>
+              <a:ext uri="{FF2B5EF4-FFF2-40B4-BE49-F238E27FC236}">
+                <a16:creationId xmlns:a16="http://schemas.microsoft.com/office/drawing/2014/main" id="{C592F173-823D-45BC-A792-52E62A4986F7}"/>
+              </a:ext>
+            </a:extLst>
+          </p:cNvPr>
+          <p:cNvSpPr>
+            <a:spLocks noGrp="1"/>
+          </p:cNvSpPr>
+          <p:nvPr>
+            <p:ph type="title"/>
+          </p:nvPr>
+        </p:nvSpPr>
+        <p:spPr/>
+        <p:txBody>
+          <a:bodyPr/>
+          <a:lstStyle/>
+          <a:p>
+            <a:pPr algn="ctr"/>
+            <a:r>
+              <a:rPr lang="en-US" b="1" dirty="0"/>
+              <a:t>Send a Request to Server Using RESTful</a:t>
+            </a:r>
+          </a:p>
+        </p:txBody>
+      </p:sp>
+      <p:pic>
+        <p:nvPicPr>
+          <p:cNvPr id="7" name="Content Placeholder 6">
+            <a:extLst>
+              <a:ext uri="{FF2B5EF4-FFF2-40B4-BE49-F238E27FC236}">
+                <a16:creationId xmlns:a16="http://schemas.microsoft.com/office/drawing/2014/main" id="{14D345B5-C4E0-4012-AA23-08E8BB31CDF3}"/>
+              </a:ext>
+            </a:extLst>
+          </p:cNvPr>
+          <p:cNvPicPr>
+            <a:picLocks noGrp="1" noChangeAspect="1"/>
+          </p:cNvPicPr>
+          <p:nvPr>
+            <p:ph idx="1"/>
+          </p:nvPr>
+        </p:nvPicPr>
+        <p:blipFill>
+          <a:blip r:embed="rId2">
+            <a:extLst>
+              <a:ext uri="{28A0092B-C50C-407E-A947-70E740481C1C}">
+                <a14:useLocalDpi xmlns:a14="http://schemas.microsoft.com/office/drawing/2010/main" val="0"/>
+              </a:ext>
+            </a:extLst>
+          </a:blip>
+          <a:stretch>
+            <a:fillRect/>
+          </a:stretch>
+        </p:blipFill>
+        <p:spPr>
+          <a:xfrm>
+            <a:off x="1810326" y="1825625"/>
+            <a:ext cx="8571348" cy="4351338"/>
+          </a:xfrm>
+        </p:spPr>
+      </p:pic>
+    </p:spTree>
+    <p:extLst>
+      <p:ext uri="{BB962C8B-B14F-4D97-AF65-F5344CB8AC3E}">
+        <p14:creationId xmlns:p14="http://schemas.microsoft.com/office/powerpoint/2010/main" val="284615154"/>
+      </p:ext>
+    </p:extLst>
+  </p:cSld>
+  <p:clrMapOvr>
+    <a:masterClrMapping/>
+  </p:clrMapOvr>
+</p:sld>
+</file>
+
+<file path=ppt/slides/slide5.xml><?xml version="1.0" encoding="utf-8"?>
+<p:sld xmlns:a="http://schemas.openxmlformats.org/drawingml/2006/main" xmlns:r="http://schemas.openxmlformats.org/officeDocument/2006/relationships" xmlns:p="http://schemas.openxmlformats.org/presentationml/2006/main">
+  <p:cSld>
+    <p:spTree>
+      <p:nvGrpSpPr>
+        <p:cNvPr id="1" name=""/>
+        <p:cNvGrpSpPr/>
+        <p:nvPr/>
+      </p:nvGrpSpPr>
+      <p:grpSpPr>
+        <a:xfrm>
+          <a:off x="0" y="0"/>
+          <a:ext cx="0" cy="0"/>
+          <a:chOff x="0" y="0"/>
+          <a:chExt cx="0" cy="0"/>
+        </a:xfrm>
+      </p:grpSpPr>
+      <p:sp>
+        <p:nvSpPr>
+          <p:cNvPr id="2" name="Title 1">
+            <a:extLst>
+              <a:ext uri="{FF2B5EF4-FFF2-40B4-BE49-F238E27FC236}">
+                <a16:creationId xmlns:a16="http://schemas.microsoft.com/office/drawing/2014/main" id="{C5507314-1D87-435B-B222-CAF87C6F0D32}"/>
+              </a:ext>
+            </a:extLst>
+          </p:cNvPr>
+          <p:cNvSpPr>
+            <a:spLocks noGrp="1"/>
+          </p:cNvSpPr>
+          <p:nvPr>
+            <p:ph type="title"/>
+          </p:nvPr>
+        </p:nvSpPr>
+        <p:spPr/>
+        <p:txBody>
+          <a:bodyPr/>
+          <a:lstStyle/>
+          <a:p>
+            <a:pPr algn="ctr"/>
+            <a:r>
+              <a:rPr lang="en-US" b="1" dirty="0"/>
+              <a:t>Server Sends a Text Message to User</a:t>
+            </a:r>
+          </a:p>
+        </p:txBody>
+      </p:sp>
+      <p:pic>
+        <p:nvPicPr>
+          <p:cNvPr id="5" name="Content Placeholder 4">
+            <a:extLst>
+              <a:ext uri="{FF2B5EF4-FFF2-40B4-BE49-F238E27FC236}">
+                <a16:creationId xmlns:a16="http://schemas.microsoft.com/office/drawing/2014/main" id="{3DC21B32-1EF2-4D01-9576-2AB8B3DD7250}"/>
+              </a:ext>
+            </a:extLst>
+          </p:cNvPr>
+          <p:cNvPicPr>
+            <a:picLocks noGrp="1" noChangeAspect="1"/>
+          </p:cNvPicPr>
+          <p:nvPr>
+            <p:ph idx="1"/>
+          </p:nvPr>
+        </p:nvPicPr>
+        <p:blipFill>
+          <a:blip r:embed="rId2">
+            <a:extLst>
+              <a:ext uri="{28A0092B-C50C-407E-A947-70E740481C1C}">
+                <a14:useLocalDpi xmlns:a14="http://schemas.microsoft.com/office/drawing/2010/main" val="0"/>
+              </a:ext>
+            </a:extLst>
+          </a:blip>
+          <a:stretch>
+            <a:fillRect/>
+          </a:stretch>
+        </p:blipFill>
+        <p:spPr>
+          <a:xfrm>
+            <a:off x="4872798" y="1825625"/>
+            <a:ext cx="2446404" cy="4351338"/>
+          </a:xfrm>
+        </p:spPr>
+      </p:pic>
+    </p:spTree>
+    <p:extLst>
+      <p:ext uri="{BB962C8B-B14F-4D97-AF65-F5344CB8AC3E}">
+        <p14:creationId xmlns:p14="http://schemas.microsoft.com/office/powerpoint/2010/main" val="2740732169"/>
+      </p:ext>
+    </p:extLst>
+  </p:cSld>
+  <p:clrMapOvr>
+    <a:masterClrMapping/>
+  </p:clrMapOvr>
+</p:sld>
+</file>
+
+<file path=ppt/slides/slide6.xml><?xml version="1.0" encoding="utf-8"?>
+<p:sld xmlns:a="http://schemas.openxmlformats.org/drawingml/2006/main" xmlns:r="http://schemas.openxmlformats.org/officeDocument/2006/relationships" xmlns:p="http://schemas.openxmlformats.org/presentationml/2006/main">
+  <p:cSld>
+    <p:spTree>
+      <p:nvGrpSpPr>
+        <p:cNvPr id="1" name=""/>
+        <p:cNvGrpSpPr/>
+        <p:nvPr/>
+      </p:nvGrpSpPr>
+      <p:grpSpPr>
+        <a:xfrm>
+          <a:off x="0" y="0"/>
+          <a:ext cx="0" cy="0"/>
+          <a:chOff x="0" y="0"/>
+          <a:chExt cx="0" cy="0"/>
+        </a:xfrm>
+      </p:grpSpPr>
+      <p:sp>
+        <p:nvSpPr>
+          <p:cNvPr id="2" name="Title 1">
+            <a:extLst>
+              <a:ext uri="{FF2B5EF4-FFF2-40B4-BE49-F238E27FC236}">
+                <a16:creationId xmlns:a16="http://schemas.microsoft.com/office/drawing/2014/main" id="{6FEF032F-AF41-4361-8B2A-F7AC978CD889}"/>
+              </a:ext>
+            </a:extLst>
+          </p:cNvPr>
+          <p:cNvSpPr>
+            <a:spLocks noGrp="1"/>
+          </p:cNvSpPr>
+          <p:nvPr>
+            <p:ph type="title"/>
+          </p:nvPr>
+        </p:nvSpPr>
+        <p:spPr/>
+        <p:txBody>
+          <a:bodyPr/>
+          <a:lstStyle/>
+          <a:p>
+            <a:pPr algn="ctr"/>
+            <a:r>
+              <a:rPr lang="en-US" b="1" dirty="0"/>
+              <a:t>Problems Encountered</a:t>
+            </a:r>
+          </a:p>
+        </p:txBody>
+      </p:sp>
+      <p:sp>
+        <p:nvSpPr>
+          <p:cNvPr id="3" name="Content Placeholder 2">
+            <a:extLst>
+              <a:ext uri="{FF2B5EF4-FFF2-40B4-BE49-F238E27FC236}">
+                <a16:creationId xmlns:a16="http://schemas.microsoft.com/office/drawing/2014/main" id="{057A1A41-2E21-4551-88E0-08A270544D35}"/>
+              </a:ext>
+            </a:extLst>
+          </p:cNvPr>
+          <p:cNvSpPr>
+            <a:spLocks noGrp="1"/>
+          </p:cNvSpPr>
+          <p:nvPr>
+            <p:ph idx="1"/>
+          </p:nvPr>
+        </p:nvSpPr>
+        <p:spPr/>
+        <p:txBody>
+          <a:bodyPr/>
+          <a:lstStyle/>
+          <a:p>
+            <a:r>
+              <a:rPr lang="en-US" dirty="0"/>
+              <a:t>Compiling OpenCV for ARM architecture</a:t>
+            </a:r>
+          </a:p>
+          <a:p>
+            <a:r>
+              <a:rPr lang="en-US" dirty="0"/>
+              <a:t>Learning to use Python</a:t>
+            </a:r>
+          </a:p>
+          <a:p>
+            <a:r>
+              <a:rPr lang="en-US" dirty="0"/>
+              <a:t>Finding out the difficulties using Windows 10 IoT Core</a:t>
+            </a:r>
+          </a:p>
+          <a:p>
+            <a:r>
+              <a:rPr lang="en-US" dirty="0"/>
+              <a:t>Training </a:t>
+            </a:r>
+            <a:r>
+              <a:rPr lang="en-US" dirty="0" err="1"/>
+              <a:t>Haar</a:t>
+            </a:r>
+            <a:r>
+              <a:rPr lang="en-US" dirty="0"/>
+              <a:t> Cascades</a:t>
+            </a:r>
+          </a:p>
+        </p:txBody>
+      </p:sp>
+    </p:spTree>
+    <p:extLst>
+      <p:ext uri="{BB962C8B-B14F-4D97-AF65-F5344CB8AC3E}">
+        <p14:creationId xmlns:p14="http://schemas.microsoft.com/office/powerpoint/2010/main" val="2164697924"/>
+      </p:ext>
+    </p:extLst>
+  </p:cSld>
+  <p:clrMapOvr>
+    <a:masterClrMapping/>
+  </p:clrMapOvr>
+</p:sld>
+</file>
+
+<file path=ppt/slides/slide7.xml><?xml version="1.0" encoding="utf-8"?>
+<p:sld xmlns:a="http://schemas.openxmlformats.org/drawingml/2006/main" xmlns:r="http://schemas.openxmlformats.org/officeDocument/2006/relationships" xmlns:p="http://schemas.openxmlformats.org/presentationml/2006/main">
+  <p:cSld>
+    <p:spTree>
+      <p:nvGrpSpPr>
+        <p:cNvPr id="1" name=""/>
+        <p:cNvGrpSpPr/>
+        <p:nvPr/>
+      </p:nvGrpSpPr>
+      <p:grpSpPr>
+        <a:xfrm>
+          <a:off x="0" y="0"/>
+          <a:ext cx="0" cy="0"/>
+          <a:chOff x="0" y="0"/>
+          <a:chExt cx="0" cy="0"/>
+        </a:xfrm>
+      </p:grpSpPr>
+      <p:sp>
+        <p:nvSpPr>
+          <p:cNvPr id="2" name="Title 1">
+            <a:extLst>
+              <a:ext uri="{FF2B5EF4-FFF2-40B4-BE49-F238E27FC236}">
+                <a16:creationId xmlns:a16="http://schemas.microsoft.com/office/drawing/2014/main" id="{7156CDE6-A3A8-4EB5-8B4B-8A79CF0717D3}"/>
+              </a:ext>
+            </a:extLst>
+          </p:cNvPr>
+          <p:cNvSpPr>
+            <a:spLocks noGrp="1"/>
+          </p:cNvSpPr>
+          <p:nvPr>
+            <p:ph type="title"/>
+          </p:nvPr>
+        </p:nvSpPr>
+        <p:spPr/>
+        <p:txBody>
+          <a:bodyPr/>
+          <a:lstStyle/>
+          <a:p>
+            <a:r>
+              <a:rPr lang="en-US" dirty="0"/>
+              <a:t>Python Client Socket Programming</a:t>
+            </a:r>
+          </a:p>
+        </p:txBody>
+      </p:sp>
+      <p:pic>
+        <p:nvPicPr>
+          <p:cNvPr id="5" name="Content Placeholder 4">
+            <a:extLst>
+              <a:ext uri="{FF2B5EF4-FFF2-40B4-BE49-F238E27FC236}">
+                <a16:creationId xmlns:a16="http://schemas.microsoft.com/office/drawing/2014/main" id="{4E711ED4-7918-422E-8F1B-274BC9D270F1}"/>
+              </a:ext>
+            </a:extLst>
+          </p:cNvPr>
+          <p:cNvPicPr>
+            <a:picLocks noGrp="1" noChangeAspect="1"/>
+          </p:cNvPicPr>
+          <p:nvPr>
+            <p:ph idx="1"/>
+          </p:nvPr>
+        </p:nvPicPr>
+        <p:blipFill>
+          <a:blip r:embed="rId2">
+            <a:extLst>
+              <a:ext uri="{28A0092B-C50C-407E-A947-70E740481C1C}">
+                <a14:useLocalDpi xmlns:a14="http://schemas.microsoft.com/office/drawing/2010/main" val="0"/>
+              </a:ext>
+            </a:extLst>
+          </a:blip>
+          <a:stretch>
+            <a:fillRect/>
+          </a:stretch>
+        </p:blipFill>
+        <p:spPr>
+          <a:xfrm>
+            <a:off x="360537" y="1690688"/>
+            <a:ext cx="1400000" cy="209524"/>
+          </a:xfrm>
+        </p:spPr>
+      </p:pic>
+      <p:pic>
+        <p:nvPicPr>
+          <p:cNvPr id="7" name="Picture 6">
+            <a:extLst>
+              <a:ext uri="{FF2B5EF4-FFF2-40B4-BE49-F238E27FC236}">
+                <a16:creationId xmlns:a16="http://schemas.microsoft.com/office/drawing/2014/main" id="{EEBDEFB2-93B4-4013-B137-CEBCB7F104C5}"/>
+              </a:ext>
+            </a:extLst>
+          </p:cNvPr>
+          <p:cNvPicPr>
+            <a:picLocks noChangeAspect="1"/>
+          </p:cNvPicPr>
+          <p:nvPr/>
+        </p:nvPicPr>
+        <p:blipFill>
+          <a:blip r:embed="rId3">
+            <a:extLst>
+              <a:ext uri="{28A0092B-C50C-407E-A947-70E740481C1C}">
+                <a14:useLocalDpi xmlns:a14="http://schemas.microsoft.com/office/drawing/2010/main" val="0"/>
+              </a:ext>
+            </a:extLst>
+          </a:blip>
+          <a:stretch>
+            <a:fillRect/>
+          </a:stretch>
+        </p:blipFill>
+        <p:spPr>
+          <a:xfrm>
+            <a:off x="360537" y="2502399"/>
+            <a:ext cx="4266667" cy="3990476"/>
+          </a:xfrm>
+          <a:prstGeom prst="rect">
+            <a:avLst/>
+          </a:prstGeom>
+        </p:spPr>
+      </p:pic>
+      <p:pic>
+        <p:nvPicPr>
+          <p:cNvPr id="9" name="Picture 8">
+            <a:extLst>
+              <a:ext uri="{FF2B5EF4-FFF2-40B4-BE49-F238E27FC236}">
+                <a16:creationId xmlns:a16="http://schemas.microsoft.com/office/drawing/2014/main" id="{586B6367-6439-4E8B-80EB-BA05BD00BD55}"/>
+              </a:ext>
+            </a:extLst>
+          </p:cNvPr>
+          <p:cNvPicPr>
+            <a:picLocks noChangeAspect="1"/>
+          </p:cNvPicPr>
+          <p:nvPr/>
+        </p:nvPicPr>
+        <p:blipFill>
+          <a:blip r:embed="rId4">
+            <a:extLst>
+              <a:ext uri="{28A0092B-C50C-407E-A947-70E740481C1C}">
+                <a14:useLocalDpi xmlns:a14="http://schemas.microsoft.com/office/drawing/2010/main" val="0"/>
+              </a:ext>
+            </a:extLst>
+          </a:blip>
+          <a:stretch>
+            <a:fillRect/>
+          </a:stretch>
+        </p:blipFill>
+        <p:spPr>
+          <a:xfrm>
+            <a:off x="8696657" y="1690688"/>
+            <a:ext cx="2657143" cy="1066667"/>
+          </a:xfrm>
+          <a:prstGeom prst="rect">
+            <a:avLst/>
+          </a:prstGeom>
+        </p:spPr>
+      </p:pic>
+      <p:pic>
+        <p:nvPicPr>
+          <p:cNvPr id="11" name="Picture 10">
+            <a:extLst>
+              <a:ext uri="{FF2B5EF4-FFF2-40B4-BE49-F238E27FC236}">
+                <a16:creationId xmlns:a16="http://schemas.microsoft.com/office/drawing/2014/main" id="{D16076B5-7833-4D91-8A96-87E83ABA4F19}"/>
+              </a:ext>
+            </a:extLst>
+          </p:cNvPr>
+          <p:cNvPicPr>
+            <a:picLocks noChangeAspect="1"/>
+          </p:cNvPicPr>
+          <p:nvPr/>
+        </p:nvPicPr>
+        <p:blipFill>
+          <a:blip r:embed="rId5">
+            <a:extLst>
+              <a:ext uri="{28A0092B-C50C-407E-A947-70E740481C1C}">
+                <a14:useLocalDpi xmlns:a14="http://schemas.microsoft.com/office/drawing/2010/main" val="0"/>
+              </a:ext>
+            </a:extLst>
+          </a:blip>
+          <a:stretch>
+            <a:fillRect/>
+          </a:stretch>
+        </p:blipFill>
+        <p:spPr>
+          <a:xfrm>
+            <a:off x="7829991" y="4667312"/>
+            <a:ext cx="3523809" cy="1000000"/>
+          </a:xfrm>
+          <a:prstGeom prst="rect">
+            <a:avLst/>
+          </a:prstGeom>
+        </p:spPr>
+      </p:pic>
+      <p:sp>
+        <p:nvSpPr>
+          <p:cNvPr id="12" name="TextBox 11">
+            <a:extLst>
+              <a:ext uri="{FF2B5EF4-FFF2-40B4-BE49-F238E27FC236}">
+                <a16:creationId xmlns:a16="http://schemas.microsoft.com/office/drawing/2014/main" id="{8BF27CED-86E2-4EF5-9A2E-58CA5F9E0E5A}"/>
+              </a:ext>
+            </a:extLst>
+          </p:cNvPr>
+          <p:cNvSpPr txBox="1"/>
+          <p:nvPr/>
+        </p:nvSpPr>
+        <p:spPr>
+          <a:xfrm>
+            <a:off x="2393461" y="1508808"/>
+            <a:ext cx="2835135" cy="461665"/>
+          </a:xfrm>
+          <a:prstGeom prst="rect">
+            <a:avLst/>
+          </a:prstGeom>
+          <a:noFill/>
+        </p:spPr>
+        <p:txBody>
+          <a:bodyPr wrap="none" rtlCol="0">
+            <a:spAutoFit/>
+          </a:bodyPr>
+          <a:lstStyle/>
+          <a:p>
+            <a:r>
+              <a:rPr lang="en-US" dirty="0"/>
+              <a:t>Import the </a:t>
+            </a:r>
+            <a:r>
+              <a:rPr lang="en-US" sz="2400" b="1" dirty="0"/>
+              <a:t>socket</a:t>
+            </a:r>
+            <a:r>
+              <a:rPr lang="en-US" dirty="0"/>
+              <a:t> module</a:t>
+            </a:r>
+          </a:p>
+        </p:txBody>
+      </p:sp>
+      <p:cxnSp>
+        <p:nvCxnSpPr>
+          <p:cNvPr id="14" name="Straight Arrow Connector 13">
+            <a:extLst>
+              <a:ext uri="{FF2B5EF4-FFF2-40B4-BE49-F238E27FC236}">
+                <a16:creationId xmlns:a16="http://schemas.microsoft.com/office/drawing/2014/main" id="{73D43630-920E-4A06-B418-2586F93C2502}"/>
+              </a:ext>
+            </a:extLst>
+          </p:cNvPr>
+          <p:cNvCxnSpPr>
+            <a:stCxn id="12" idx="1"/>
+            <a:endCxn id="5" idx="3"/>
+          </p:cNvCxnSpPr>
+          <p:nvPr/>
+        </p:nvCxnSpPr>
+        <p:spPr>
+          <a:xfrm flipH="1">
+            <a:off x="1760537" y="1739641"/>
+            <a:ext cx="632924" cy="55809"/>
+          </a:xfrm>
+          <a:prstGeom prst="straightConnector1">
+            <a:avLst/>
+          </a:prstGeom>
+          <a:ln>
+            <a:tailEnd type="triangle"/>
+          </a:ln>
+        </p:spPr>
+        <p:style>
+          <a:lnRef idx="1">
+            <a:schemeClr val="dk1"/>
+          </a:lnRef>
+          <a:fillRef idx="0">
+            <a:schemeClr val="dk1"/>
+          </a:fillRef>
+          <a:effectRef idx="0">
+            <a:schemeClr val="dk1"/>
+          </a:effectRef>
+          <a:fontRef idx="minor">
+            <a:schemeClr val="tx1"/>
+          </a:fontRef>
+        </p:style>
+      </p:cxnSp>
+      <p:sp>
+        <p:nvSpPr>
+          <p:cNvPr id="15" name="TextBox 14">
+            <a:extLst>
+              <a:ext uri="{FF2B5EF4-FFF2-40B4-BE49-F238E27FC236}">
+                <a16:creationId xmlns:a16="http://schemas.microsoft.com/office/drawing/2014/main" id="{B2EB71A0-9F93-48C2-8E03-E8FFE3233AC3}"/>
+              </a:ext>
+            </a:extLst>
+          </p:cNvPr>
+          <p:cNvSpPr txBox="1"/>
+          <p:nvPr/>
+        </p:nvSpPr>
+        <p:spPr>
+          <a:xfrm>
+            <a:off x="4797468" y="3181611"/>
+            <a:ext cx="2617940" cy="1200329"/>
+          </a:xfrm>
+          <a:prstGeom prst="rect">
+            <a:avLst/>
+          </a:prstGeom>
+          <a:noFill/>
+        </p:spPr>
+        <p:txBody>
+          <a:bodyPr wrap="square" rtlCol="0">
+            <a:spAutoFit/>
+          </a:bodyPr>
+          <a:lstStyle/>
+          <a:p>
+            <a:r>
+              <a:rPr lang="en-US" dirty="0"/>
+              <a:t>Create socket with the Address Family, and the Transmission Type (STREAM vs DATAGRAM)</a:t>
+            </a:r>
+          </a:p>
+        </p:txBody>
+      </p:sp>
+      <p:cxnSp>
+        <p:nvCxnSpPr>
+          <p:cNvPr id="17" name="Straight Arrow Connector 16">
+            <a:extLst>
+              <a:ext uri="{FF2B5EF4-FFF2-40B4-BE49-F238E27FC236}">
+                <a16:creationId xmlns:a16="http://schemas.microsoft.com/office/drawing/2014/main" id="{F218D1AF-DACB-4EEC-89D3-FA54B0C54DD9}"/>
+              </a:ext>
+            </a:extLst>
+          </p:cNvPr>
+          <p:cNvCxnSpPr>
+            <a:stCxn id="15" idx="1"/>
+          </p:cNvCxnSpPr>
+          <p:nvPr/>
+        </p:nvCxnSpPr>
+        <p:spPr>
+          <a:xfrm flipH="1">
+            <a:off x="2668044" y="3781776"/>
+            <a:ext cx="2129424" cy="314235"/>
+          </a:xfrm>
+          <a:prstGeom prst="straightConnector1">
+            <a:avLst/>
+          </a:prstGeom>
+          <a:ln>
+            <a:tailEnd type="triangle"/>
+          </a:ln>
+        </p:spPr>
+        <p:style>
+          <a:lnRef idx="1">
+            <a:schemeClr val="dk1"/>
+          </a:lnRef>
+          <a:fillRef idx="0">
+            <a:schemeClr val="dk1"/>
+          </a:fillRef>
+          <a:effectRef idx="0">
+            <a:schemeClr val="dk1"/>
+          </a:effectRef>
+          <a:fontRef idx="minor">
+            <a:schemeClr val="tx1"/>
+          </a:fontRef>
+        </p:style>
+      </p:cxnSp>
+      <p:sp>
+        <p:nvSpPr>
+          <p:cNvPr id="18" name="TextBox 17">
+            <a:extLst>
+              <a:ext uri="{FF2B5EF4-FFF2-40B4-BE49-F238E27FC236}">
+                <a16:creationId xmlns:a16="http://schemas.microsoft.com/office/drawing/2014/main" id="{1BC54C45-C801-4F1F-A4F4-5BAB45E1F8F3}"/>
+              </a:ext>
+            </a:extLst>
+          </p:cNvPr>
+          <p:cNvSpPr txBox="1"/>
+          <p:nvPr/>
+        </p:nvSpPr>
+        <p:spPr>
+          <a:xfrm>
+            <a:off x="4882491" y="5349192"/>
+            <a:ext cx="2692212" cy="923330"/>
+          </a:xfrm>
+          <a:prstGeom prst="rect">
+            <a:avLst/>
+          </a:prstGeom>
+          <a:noFill/>
+        </p:spPr>
+        <p:txBody>
+          <a:bodyPr wrap="none" rtlCol="0">
+            <a:spAutoFit/>
+          </a:bodyPr>
+          <a:lstStyle/>
+          <a:p>
+            <a:r>
+              <a:rPr lang="en-US" dirty="0"/>
+              <a:t>Connect that socket object</a:t>
+            </a:r>
+          </a:p>
+          <a:p>
+            <a:r>
+              <a:rPr lang="en-US" dirty="0"/>
+              <a:t>Using the IP Address and</a:t>
+            </a:r>
+          </a:p>
+          <a:p>
+            <a:r>
+              <a:rPr lang="en-US" dirty="0"/>
+              <a:t>the Port</a:t>
+            </a:r>
+          </a:p>
+        </p:txBody>
+      </p:sp>
+      <p:cxnSp>
+        <p:nvCxnSpPr>
+          <p:cNvPr id="20" name="Straight Arrow Connector 19">
+            <a:extLst>
+              <a:ext uri="{FF2B5EF4-FFF2-40B4-BE49-F238E27FC236}">
+                <a16:creationId xmlns:a16="http://schemas.microsoft.com/office/drawing/2014/main" id="{FB04A2DC-23E3-4C59-A702-5F94BDD9B52A}"/>
+              </a:ext>
+            </a:extLst>
+          </p:cNvPr>
+          <p:cNvCxnSpPr>
+            <a:stCxn id="18" idx="1"/>
+          </p:cNvCxnSpPr>
+          <p:nvPr/>
+        </p:nvCxnSpPr>
+        <p:spPr>
+          <a:xfrm flipH="1" flipV="1">
+            <a:off x="2267211" y="5774499"/>
+            <a:ext cx="2615280" cy="36358"/>
+          </a:xfrm>
+          <a:prstGeom prst="straightConnector1">
+            <a:avLst/>
+          </a:prstGeom>
+          <a:ln>
+            <a:tailEnd type="triangle"/>
+          </a:ln>
+        </p:spPr>
+        <p:style>
+          <a:lnRef idx="1">
+            <a:schemeClr val="dk1"/>
+          </a:lnRef>
+          <a:fillRef idx="0">
+            <a:schemeClr val="dk1"/>
+          </a:fillRef>
+          <a:effectRef idx="0">
+            <a:schemeClr val="dk1"/>
+          </a:effectRef>
+          <a:fontRef idx="minor">
+            <a:schemeClr val="tx1"/>
+          </a:fontRef>
+        </p:style>
+      </p:cxnSp>
+      <p:cxnSp>
+        <p:nvCxnSpPr>
+          <p:cNvPr id="22" name="Straight Arrow Connector 21">
+            <a:extLst>
+              <a:ext uri="{FF2B5EF4-FFF2-40B4-BE49-F238E27FC236}">
+                <a16:creationId xmlns:a16="http://schemas.microsoft.com/office/drawing/2014/main" id="{658EECB7-7123-4697-8BD3-D3DCDBF074EA}"/>
+              </a:ext>
+            </a:extLst>
+          </p:cNvPr>
+          <p:cNvCxnSpPr>
+            <a:cxnSpLocks/>
+          </p:cNvCxnSpPr>
+          <p:nvPr/>
+        </p:nvCxnSpPr>
+        <p:spPr>
+          <a:xfrm flipH="1" flipV="1">
+            <a:off x="1553228" y="3114157"/>
+            <a:ext cx="3983276" cy="2335970"/>
+          </a:xfrm>
+          <a:prstGeom prst="straightConnector1">
+            <a:avLst/>
+          </a:prstGeom>
+          <a:ln>
+            <a:tailEnd type="triangle"/>
+          </a:ln>
+        </p:spPr>
+        <p:style>
+          <a:lnRef idx="1">
+            <a:schemeClr val="accent2"/>
+          </a:lnRef>
+          <a:fillRef idx="0">
+            <a:schemeClr val="accent2"/>
+          </a:fillRef>
+          <a:effectRef idx="0">
+            <a:schemeClr val="accent2"/>
+          </a:effectRef>
+          <a:fontRef idx="minor">
+            <a:schemeClr val="tx1"/>
+          </a:fontRef>
+        </p:style>
+      </p:cxnSp>
+      <p:cxnSp>
+        <p:nvCxnSpPr>
+          <p:cNvPr id="25" name="Straight Arrow Connector 24">
+            <a:extLst>
+              <a:ext uri="{FF2B5EF4-FFF2-40B4-BE49-F238E27FC236}">
+                <a16:creationId xmlns:a16="http://schemas.microsoft.com/office/drawing/2014/main" id="{0437E575-F9BB-466F-9364-065B55F144A3}"/>
+              </a:ext>
+            </a:extLst>
+          </p:cNvPr>
+          <p:cNvCxnSpPr/>
+          <p:nvPr/>
+        </p:nvCxnSpPr>
+        <p:spPr>
+          <a:xfrm flipH="1" flipV="1">
+            <a:off x="1240077" y="2668044"/>
+            <a:ext cx="1427967" cy="1113731"/>
+          </a:xfrm>
+          <a:prstGeom prst="straightConnector1">
+            <a:avLst/>
+          </a:prstGeom>
+          <a:ln>
+            <a:tailEnd type="triangle"/>
+          </a:ln>
+        </p:spPr>
+        <p:style>
+          <a:lnRef idx="1">
+            <a:schemeClr val="accent2"/>
+          </a:lnRef>
+          <a:fillRef idx="0">
+            <a:schemeClr val="accent2"/>
+          </a:fillRef>
+          <a:effectRef idx="0">
+            <a:schemeClr val="accent2"/>
+          </a:effectRef>
+          <a:fontRef idx="minor">
+            <a:schemeClr val="tx1"/>
+          </a:fontRef>
+        </p:style>
+      </p:cxnSp>
+      <p:sp>
+        <p:nvSpPr>
+          <p:cNvPr id="26" name="TextBox 25">
+            <a:extLst>
+              <a:ext uri="{FF2B5EF4-FFF2-40B4-BE49-F238E27FC236}">
+                <a16:creationId xmlns:a16="http://schemas.microsoft.com/office/drawing/2014/main" id="{80EEBF9E-1519-49E1-8CD9-D7C5336F4F14}"/>
+              </a:ext>
+            </a:extLst>
+          </p:cNvPr>
+          <p:cNvSpPr txBox="1"/>
+          <p:nvPr/>
+        </p:nvSpPr>
+        <p:spPr>
+          <a:xfrm>
+            <a:off x="8521762" y="3458609"/>
+            <a:ext cx="2140266" cy="646331"/>
+          </a:xfrm>
+          <a:prstGeom prst="rect">
+            <a:avLst/>
+          </a:prstGeom>
+          <a:noFill/>
+        </p:spPr>
+        <p:txBody>
+          <a:bodyPr wrap="none" rtlCol="0">
+            <a:spAutoFit/>
+          </a:bodyPr>
+          <a:lstStyle/>
+          <a:p>
+            <a:pPr algn="ctr"/>
+            <a:r>
+              <a:rPr lang="en-US" dirty="0"/>
+              <a:t>Send making sure</a:t>
+            </a:r>
+          </a:p>
+          <a:p>
+            <a:pPr algn="ctr"/>
+            <a:r>
+              <a:rPr lang="en-US" dirty="0"/>
+              <a:t>Packet is transmitted</a:t>
+            </a:r>
+          </a:p>
+        </p:txBody>
+      </p:sp>
+      <p:cxnSp>
+        <p:nvCxnSpPr>
+          <p:cNvPr id="28" name="Straight Arrow Connector 27">
+            <a:extLst>
+              <a:ext uri="{FF2B5EF4-FFF2-40B4-BE49-F238E27FC236}">
+                <a16:creationId xmlns:a16="http://schemas.microsoft.com/office/drawing/2014/main" id="{DBEE2612-EEFC-4C80-A2B6-867FAECE2E56}"/>
+              </a:ext>
+            </a:extLst>
+          </p:cNvPr>
+          <p:cNvCxnSpPr>
+            <a:stCxn id="26" idx="0"/>
+          </p:cNvCxnSpPr>
+          <p:nvPr/>
+        </p:nvCxnSpPr>
+        <p:spPr>
+          <a:xfrm flipV="1">
+            <a:off x="9591895" y="2757355"/>
+            <a:ext cx="103250" cy="701254"/>
+          </a:xfrm>
+          <a:prstGeom prst="straightConnector1">
+            <a:avLst/>
+          </a:prstGeom>
+          <a:ln>
+            <a:tailEnd type="triangle"/>
+          </a:ln>
+        </p:spPr>
+        <p:style>
+          <a:lnRef idx="1">
+            <a:schemeClr val="dk1"/>
+          </a:lnRef>
+          <a:fillRef idx="0">
+            <a:schemeClr val="dk1"/>
+          </a:fillRef>
+          <a:effectRef idx="0">
+            <a:schemeClr val="dk1"/>
+          </a:effectRef>
+          <a:fontRef idx="minor">
+            <a:schemeClr val="tx1"/>
+          </a:fontRef>
+        </p:style>
+      </p:cxnSp>
+      <p:cxnSp>
+        <p:nvCxnSpPr>
+          <p:cNvPr id="30" name="Straight Arrow Connector 29">
+            <a:extLst>
+              <a:ext uri="{FF2B5EF4-FFF2-40B4-BE49-F238E27FC236}">
+                <a16:creationId xmlns:a16="http://schemas.microsoft.com/office/drawing/2014/main" id="{6E1EDD62-5D61-42CF-9F5D-A20FA2E614D5}"/>
+              </a:ext>
+            </a:extLst>
+          </p:cNvPr>
+          <p:cNvCxnSpPr>
+            <a:stCxn id="26" idx="2"/>
+            <a:endCxn id="11" idx="0"/>
+          </p:cNvCxnSpPr>
+          <p:nvPr/>
+        </p:nvCxnSpPr>
+        <p:spPr>
+          <a:xfrm>
+            <a:off x="9591895" y="4104940"/>
+            <a:ext cx="1" cy="562372"/>
+          </a:xfrm>
+          <a:prstGeom prst="straightConnector1">
+            <a:avLst/>
+          </a:prstGeom>
+          <a:ln>
+            <a:tailEnd type="triangle"/>
+          </a:ln>
+        </p:spPr>
+        <p:style>
+          <a:lnRef idx="1">
+            <a:schemeClr val="dk1"/>
+          </a:lnRef>
+          <a:fillRef idx="0">
+            <a:schemeClr val="dk1"/>
+          </a:fillRef>
+          <a:effectRef idx="0">
+            <a:schemeClr val="dk1"/>
+          </a:effectRef>
+          <a:fontRef idx="minor">
+            <a:schemeClr val="tx1"/>
+          </a:fontRef>
+        </p:style>
+      </p:cxnSp>
+    </p:spTree>
+    <p:extLst>
+      <p:ext uri="{BB962C8B-B14F-4D97-AF65-F5344CB8AC3E}">
+        <p14:creationId xmlns:p14="http://schemas.microsoft.com/office/powerpoint/2010/main" val="3313856892"/>
+      </p:ext>
+    </p:extLst>
+  </p:cSld>
+  <p:clrMapOvr>
+    <a:masterClrMapping/>
+  </p:clrMapOvr>
+</p:sld>
+</file>
+
+<file path=ppt/slides/slide8.xml><?xml version="1.0" encoding="utf-8"?>
+<p:sld xmlns:a="http://schemas.openxmlformats.org/drawingml/2006/main" xmlns:r="http://schemas.openxmlformats.org/officeDocument/2006/relationships" xmlns:p="http://schemas.openxmlformats.org/presentationml/2006/main">
+  <p:cSld>
+    <p:spTree>
+      <p:nvGrpSpPr>
+        <p:cNvPr id="1" name=""/>
+        <p:cNvGrpSpPr/>
+        <p:nvPr/>
+      </p:nvGrpSpPr>
+      <p:grpSpPr>
+        <a:xfrm>
+          <a:off x="0" y="0"/>
+          <a:ext cx="0" cy="0"/>
+          <a:chOff x="0" y="0"/>
+          <a:chExt cx="0" cy="0"/>
+        </a:xfrm>
+      </p:grpSpPr>
+      <p:sp>
+        <p:nvSpPr>
+          <p:cNvPr id="2" name="Title 1">
+            <a:extLst>
+              <a:ext uri="{FF2B5EF4-FFF2-40B4-BE49-F238E27FC236}">
+                <a16:creationId xmlns:a16="http://schemas.microsoft.com/office/drawing/2014/main" id="{D70EC163-BC1B-4CA6-9344-0FD22C1DAA90}"/>
+              </a:ext>
+            </a:extLst>
+          </p:cNvPr>
+          <p:cNvSpPr>
+            <a:spLocks noGrp="1"/>
+          </p:cNvSpPr>
+          <p:nvPr>
+            <p:ph type="title"/>
+          </p:nvPr>
+        </p:nvSpPr>
+        <p:spPr/>
+        <p:txBody>
+          <a:bodyPr/>
+          <a:lstStyle/>
+          <a:p>
+            <a:r>
+              <a:rPr lang="en-US" dirty="0"/>
+              <a:t>Python Server Programming</a:t>
+            </a:r>
+          </a:p>
+        </p:txBody>
+      </p:sp>
+      <p:pic>
+        <p:nvPicPr>
+          <p:cNvPr id="5" name="Content Placeholder 4">
+            <a:extLst>
+              <a:ext uri="{FF2B5EF4-FFF2-40B4-BE49-F238E27FC236}">
+                <a16:creationId xmlns:a16="http://schemas.microsoft.com/office/drawing/2014/main" id="{78C7A694-E2EA-4CFC-B6FC-51FF83FB3793}"/>
+              </a:ext>
+            </a:extLst>
+          </p:cNvPr>
+          <p:cNvPicPr>
+            <a:picLocks noGrp="1" noChangeAspect="1"/>
+          </p:cNvPicPr>
+          <p:nvPr>
+            <p:ph idx="1"/>
+          </p:nvPr>
+        </p:nvPicPr>
+        <p:blipFill>
+          <a:blip r:embed="rId2">
+            <a:extLst>
+              <a:ext uri="{28A0092B-C50C-407E-A947-70E740481C1C}">
+                <a14:useLocalDpi xmlns:a14="http://schemas.microsoft.com/office/drawing/2010/main" val="0"/>
+              </a:ext>
+            </a:extLst>
+          </a:blip>
+          <a:stretch>
+            <a:fillRect/>
+          </a:stretch>
+        </p:blipFill>
+        <p:spPr>
+          <a:xfrm>
+            <a:off x="510849" y="1690688"/>
+            <a:ext cx="1400000" cy="209524"/>
+          </a:xfrm>
+        </p:spPr>
+      </p:pic>
+      <p:pic>
+        <p:nvPicPr>
+          <p:cNvPr id="7" name="Picture 6">
+            <a:extLst>
+              <a:ext uri="{FF2B5EF4-FFF2-40B4-BE49-F238E27FC236}">
+                <a16:creationId xmlns:a16="http://schemas.microsoft.com/office/drawing/2014/main" id="{C622656E-27F4-49D8-8F8E-0363FC40B3F8}"/>
+              </a:ext>
+            </a:extLst>
+          </p:cNvPr>
+          <p:cNvPicPr>
+            <a:picLocks noChangeAspect="1"/>
+          </p:cNvPicPr>
+          <p:nvPr/>
+        </p:nvPicPr>
+        <p:blipFill>
+          <a:blip r:embed="rId3">
+            <a:extLst>
+              <a:ext uri="{28A0092B-C50C-407E-A947-70E740481C1C}">
+                <a14:useLocalDpi xmlns:a14="http://schemas.microsoft.com/office/drawing/2010/main" val="0"/>
+              </a:ext>
+            </a:extLst>
+          </a:blip>
+          <a:stretch>
+            <a:fillRect/>
+          </a:stretch>
+        </p:blipFill>
+        <p:spPr>
+          <a:xfrm>
+            <a:off x="493834" y="2240742"/>
+            <a:ext cx="1514286" cy="600000"/>
+          </a:xfrm>
+          <a:prstGeom prst="rect">
+            <a:avLst/>
+          </a:prstGeom>
+        </p:spPr>
+      </p:pic>
+      <p:pic>
+        <p:nvPicPr>
+          <p:cNvPr id="9" name="Picture 8">
+            <a:extLst>
+              <a:ext uri="{FF2B5EF4-FFF2-40B4-BE49-F238E27FC236}">
+                <a16:creationId xmlns:a16="http://schemas.microsoft.com/office/drawing/2014/main" id="{2728A037-6A02-4197-A1B7-DA2108997156}"/>
+              </a:ext>
+            </a:extLst>
+          </p:cNvPr>
+          <p:cNvPicPr>
+            <a:picLocks noChangeAspect="1"/>
+          </p:cNvPicPr>
+          <p:nvPr/>
+        </p:nvPicPr>
+        <p:blipFill>
+          <a:blip r:embed="rId4">
+            <a:extLst>
+              <a:ext uri="{28A0092B-C50C-407E-A947-70E740481C1C}">
+                <a14:useLocalDpi xmlns:a14="http://schemas.microsoft.com/office/drawing/2010/main" val="0"/>
+              </a:ext>
+            </a:extLst>
+          </a:blip>
+          <a:stretch>
+            <a:fillRect/>
+          </a:stretch>
+        </p:blipFill>
+        <p:spPr>
+          <a:xfrm>
+            <a:off x="493834" y="3347772"/>
+            <a:ext cx="1571429" cy="666667"/>
+          </a:xfrm>
+          <a:prstGeom prst="rect">
+            <a:avLst/>
+          </a:prstGeom>
+        </p:spPr>
+      </p:pic>
+      <p:pic>
+        <p:nvPicPr>
+          <p:cNvPr id="11" name="Picture 10">
+            <a:extLst>
+              <a:ext uri="{FF2B5EF4-FFF2-40B4-BE49-F238E27FC236}">
+                <a16:creationId xmlns:a16="http://schemas.microsoft.com/office/drawing/2014/main" id="{9B13B09D-5B77-44E8-B432-707CAC80D834}"/>
+              </a:ext>
+            </a:extLst>
+          </p:cNvPr>
+          <p:cNvPicPr>
+            <a:picLocks noChangeAspect="1"/>
+          </p:cNvPicPr>
+          <p:nvPr/>
+        </p:nvPicPr>
+        <p:blipFill>
+          <a:blip r:embed="rId5">
+            <a:extLst>
+              <a:ext uri="{28A0092B-C50C-407E-A947-70E740481C1C}">
+                <a14:useLocalDpi xmlns:a14="http://schemas.microsoft.com/office/drawing/2010/main" val="0"/>
+              </a:ext>
+            </a:extLst>
+          </a:blip>
+          <a:stretch>
+            <a:fillRect/>
+          </a:stretch>
+        </p:blipFill>
+        <p:spPr>
+          <a:xfrm>
+            <a:off x="493834" y="4643399"/>
+            <a:ext cx="2523809" cy="1409524"/>
+          </a:xfrm>
+          <a:prstGeom prst="rect">
+            <a:avLst/>
+          </a:prstGeom>
+        </p:spPr>
+      </p:pic>
+      <p:sp>
+        <p:nvSpPr>
+          <p:cNvPr id="12" name="TextBox 11">
+            <a:extLst>
+              <a:ext uri="{FF2B5EF4-FFF2-40B4-BE49-F238E27FC236}">
+                <a16:creationId xmlns:a16="http://schemas.microsoft.com/office/drawing/2014/main" id="{5DC4FBB1-CC8A-4691-960C-3D99F70E5EAD}"/>
+              </a:ext>
+            </a:extLst>
+          </p:cNvPr>
+          <p:cNvSpPr txBox="1"/>
+          <p:nvPr/>
+        </p:nvSpPr>
+        <p:spPr>
+          <a:xfrm>
+            <a:off x="3017643" y="1504049"/>
+            <a:ext cx="2857577" cy="461665"/>
+          </a:xfrm>
+          <a:prstGeom prst="rect">
+            <a:avLst/>
+          </a:prstGeom>
+          <a:noFill/>
+        </p:spPr>
+        <p:txBody>
+          <a:bodyPr wrap="none" rtlCol="0">
+            <a:spAutoFit/>
+          </a:bodyPr>
+          <a:lstStyle/>
+          <a:p>
+            <a:r>
+              <a:rPr lang="en-US" dirty="0"/>
+              <a:t>Import the </a:t>
+            </a:r>
+            <a:r>
+              <a:rPr lang="en-US" sz="2400" b="1" dirty="0"/>
+              <a:t>Socket</a:t>
+            </a:r>
+            <a:r>
+              <a:rPr lang="en-US" dirty="0"/>
+              <a:t> module</a:t>
+            </a:r>
+          </a:p>
+        </p:txBody>
+      </p:sp>
+      <p:cxnSp>
+        <p:nvCxnSpPr>
+          <p:cNvPr id="14" name="Straight Arrow Connector 13">
+            <a:extLst>
+              <a:ext uri="{FF2B5EF4-FFF2-40B4-BE49-F238E27FC236}">
+                <a16:creationId xmlns:a16="http://schemas.microsoft.com/office/drawing/2014/main" id="{4E21CA25-3086-4C57-83B7-FE8F7E9D9FF8}"/>
+              </a:ext>
+            </a:extLst>
+          </p:cNvPr>
+          <p:cNvCxnSpPr>
+            <a:stCxn id="12" idx="1"/>
+            <a:endCxn id="5" idx="3"/>
+          </p:cNvCxnSpPr>
+          <p:nvPr/>
+        </p:nvCxnSpPr>
+        <p:spPr>
+          <a:xfrm flipH="1">
+            <a:off x="1910849" y="1734882"/>
+            <a:ext cx="1106794" cy="60568"/>
+          </a:xfrm>
+          <a:prstGeom prst="straightConnector1">
+            <a:avLst/>
+          </a:prstGeom>
+          <a:ln>
+            <a:tailEnd type="triangle"/>
+          </a:ln>
+        </p:spPr>
+        <p:style>
+          <a:lnRef idx="1">
+            <a:schemeClr val="dk1"/>
+          </a:lnRef>
+          <a:fillRef idx="0">
+            <a:schemeClr val="dk1"/>
+          </a:fillRef>
+          <a:effectRef idx="0">
+            <a:schemeClr val="dk1"/>
+          </a:effectRef>
+          <a:fontRef idx="minor">
+            <a:schemeClr val="tx1"/>
+          </a:fontRef>
+        </p:style>
+      </p:cxnSp>
+      <p:sp>
+        <p:nvSpPr>
+          <p:cNvPr id="15" name="TextBox 14">
+            <a:extLst>
+              <a:ext uri="{FF2B5EF4-FFF2-40B4-BE49-F238E27FC236}">
+                <a16:creationId xmlns:a16="http://schemas.microsoft.com/office/drawing/2014/main" id="{B2A1735C-F72E-49F3-BCAE-AB311499CD42}"/>
+              </a:ext>
+            </a:extLst>
+          </p:cNvPr>
+          <p:cNvSpPr txBox="1"/>
+          <p:nvPr/>
+        </p:nvSpPr>
+        <p:spPr>
+          <a:xfrm>
+            <a:off x="3331923" y="2404997"/>
+            <a:ext cx="5190139" cy="369332"/>
+          </a:xfrm>
+          <a:prstGeom prst="rect">
+            <a:avLst/>
+          </a:prstGeom>
+          <a:noFill/>
+        </p:spPr>
+        <p:txBody>
+          <a:bodyPr wrap="none" rtlCol="0">
+            <a:spAutoFit/>
+          </a:bodyPr>
+          <a:lstStyle/>
+          <a:p>
+            <a:r>
+              <a:rPr lang="en-US" dirty="0"/>
+              <a:t>Create the socket object and specify the port number</a:t>
+            </a:r>
+          </a:p>
+        </p:txBody>
+      </p:sp>
+      <p:cxnSp>
+        <p:nvCxnSpPr>
+          <p:cNvPr id="17" name="Straight Arrow Connector 16">
+            <a:extLst>
+              <a:ext uri="{FF2B5EF4-FFF2-40B4-BE49-F238E27FC236}">
+                <a16:creationId xmlns:a16="http://schemas.microsoft.com/office/drawing/2014/main" id="{7D72D21D-DB37-45FE-B00A-9570FF89B4BC}"/>
+              </a:ext>
+            </a:extLst>
+          </p:cNvPr>
+          <p:cNvCxnSpPr>
+            <a:stCxn id="15" idx="1"/>
+            <a:endCxn id="7" idx="3"/>
+          </p:cNvCxnSpPr>
+          <p:nvPr/>
+        </p:nvCxnSpPr>
+        <p:spPr>
+          <a:xfrm flipH="1" flipV="1">
+            <a:off x="2008120" y="2540742"/>
+            <a:ext cx="1323803" cy="48921"/>
+          </a:xfrm>
+          <a:prstGeom prst="straightConnector1">
+            <a:avLst/>
+          </a:prstGeom>
+          <a:ln>
+            <a:tailEnd type="triangle"/>
+          </a:ln>
+        </p:spPr>
+        <p:style>
+          <a:lnRef idx="1">
+            <a:schemeClr val="dk1"/>
+          </a:lnRef>
+          <a:fillRef idx="0">
+            <a:schemeClr val="dk1"/>
+          </a:fillRef>
+          <a:effectRef idx="0">
+            <a:schemeClr val="dk1"/>
+          </a:effectRef>
+          <a:fontRef idx="minor">
+            <a:schemeClr val="tx1"/>
+          </a:fontRef>
+        </p:style>
+      </p:cxnSp>
+      <p:sp>
+        <p:nvSpPr>
+          <p:cNvPr id="18" name="TextBox 17">
+            <a:extLst>
+              <a:ext uri="{FF2B5EF4-FFF2-40B4-BE49-F238E27FC236}">
+                <a16:creationId xmlns:a16="http://schemas.microsoft.com/office/drawing/2014/main" id="{827E50E7-9E67-4BBA-B005-184316FA5046}"/>
+              </a:ext>
+            </a:extLst>
+          </p:cNvPr>
+          <p:cNvSpPr txBox="1"/>
+          <p:nvPr/>
+        </p:nvSpPr>
+        <p:spPr>
+          <a:xfrm>
+            <a:off x="3331923" y="3219440"/>
+            <a:ext cx="8899744" cy="1200329"/>
+          </a:xfrm>
+          <a:prstGeom prst="rect">
+            <a:avLst/>
+          </a:prstGeom>
+          <a:noFill/>
+        </p:spPr>
+        <p:txBody>
+          <a:bodyPr wrap="none" rtlCol="0">
+            <a:spAutoFit/>
+          </a:bodyPr>
+          <a:lstStyle/>
+          <a:p>
+            <a:r>
+              <a:rPr lang="en-US" dirty="0"/>
+              <a:t>Bind that port to that socket (the empty quotes means accept connection on local network)</a:t>
+            </a:r>
+          </a:p>
+          <a:p>
+            <a:r>
+              <a:rPr lang="en-US" dirty="0"/>
+              <a:t>Set that socket to listen on that port (5 is the maximum number of queued connections)</a:t>
+            </a:r>
+          </a:p>
+          <a:p>
+            <a:r>
+              <a:rPr lang="en-US" dirty="0"/>
+              <a:t>Accept the next incoming connection on that port (c is the connection object, and addr is the</a:t>
+            </a:r>
+          </a:p>
+          <a:p>
+            <a:r>
+              <a:rPr lang="en-US" dirty="0"/>
+              <a:t>client’s address information</a:t>
+            </a:r>
+          </a:p>
+        </p:txBody>
+      </p:sp>
+      <p:cxnSp>
+        <p:nvCxnSpPr>
+          <p:cNvPr id="20" name="Straight Arrow Connector 19">
+            <a:extLst>
+              <a:ext uri="{FF2B5EF4-FFF2-40B4-BE49-F238E27FC236}">
+                <a16:creationId xmlns:a16="http://schemas.microsoft.com/office/drawing/2014/main" id="{15351D0E-6F8E-46E5-A2AD-3DFBD1265936}"/>
+              </a:ext>
+            </a:extLst>
+          </p:cNvPr>
+          <p:cNvCxnSpPr/>
+          <p:nvPr/>
+        </p:nvCxnSpPr>
+        <p:spPr>
+          <a:xfrm flipH="1">
+            <a:off x="1910849" y="3347772"/>
+            <a:ext cx="1421074" cy="81228"/>
+          </a:xfrm>
+          <a:prstGeom prst="straightConnector1">
+            <a:avLst/>
+          </a:prstGeom>
+          <a:ln>
+            <a:tailEnd type="triangle"/>
+          </a:ln>
+        </p:spPr>
+        <p:style>
+          <a:lnRef idx="1">
+            <a:schemeClr val="dk1"/>
+          </a:lnRef>
+          <a:fillRef idx="0">
+            <a:schemeClr val="dk1"/>
+          </a:fillRef>
+          <a:effectRef idx="0">
+            <a:schemeClr val="dk1"/>
+          </a:effectRef>
+          <a:fontRef idx="minor">
+            <a:schemeClr val="tx1"/>
+          </a:fontRef>
+        </p:style>
+      </p:cxnSp>
+      <p:cxnSp>
+        <p:nvCxnSpPr>
+          <p:cNvPr id="22" name="Straight Arrow Connector 21">
+            <a:extLst>
+              <a:ext uri="{FF2B5EF4-FFF2-40B4-BE49-F238E27FC236}">
+                <a16:creationId xmlns:a16="http://schemas.microsoft.com/office/drawing/2014/main" id="{B4B1FD45-E934-4D8D-925B-F9E6CBE1AE01}"/>
+              </a:ext>
+            </a:extLst>
+          </p:cNvPr>
+          <p:cNvCxnSpPr>
+            <a:cxnSpLocks/>
+          </p:cNvCxnSpPr>
+          <p:nvPr/>
+        </p:nvCxnSpPr>
+        <p:spPr>
+          <a:xfrm flipH="1">
+            <a:off x="1402915" y="3681106"/>
+            <a:ext cx="1929008" cy="1"/>
+          </a:xfrm>
+          <a:prstGeom prst="straightConnector1">
+            <a:avLst/>
+          </a:prstGeom>
+          <a:ln>
+            <a:tailEnd type="triangle"/>
+          </a:ln>
+        </p:spPr>
+        <p:style>
+          <a:lnRef idx="1">
+            <a:schemeClr val="dk1"/>
+          </a:lnRef>
+          <a:fillRef idx="0">
+            <a:schemeClr val="dk1"/>
+          </a:fillRef>
+          <a:effectRef idx="0">
+            <a:schemeClr val="dk1"/>
+          </a:effectRef>
+          <a:fontRef idx="minor">
+            <a:schemeClr val="tx1"/>
+          </a:fontRef>
+        </p:style>
+      </p:cxnSp>
+      <p:cxnSp>
+        <p:nvCxnSpPr>
+          <p:cNvPr id="24" name="Straight Arrow Connector 23">
+            <a:extLst>
+              <a:ext uri="{FF2B5EF4-FFF2-40B4-BE49-F238E27FC236}">
+                <a16:creationId xmlns:a16="http://schemas.microsoft.com/office/drawing/2014/main" id="{277D95F9-DE25-41D5-8DBA-D9E57B39FBB3}"/>
+              </a:ext>
+            </a:extLst>
+          </p:cNvPr>
+          <p:cNvCxnSpPr/>
+          <p:nvPr/>
+        </p:nvCxnSpPr>
+        <p:spPr>
+          <a:xfrm flipH="1" flipV="1">
+            <a:off x="2008120" y="3908121"/>
+            <a:ext cx="1323803" cy="106318"/>
+          </a:xfrm>
+          <a:prstGeom prst="straightConnector1">
+            <a:avLst/>
+          </a:prstGeom>
+          <a:ln>
+            <a:tailEnd type="triangle"/>
+          </a:ln>
+        </p:spPr>
+        <p:style>
+          <a:lnRef idx="1">
+            <a:schemeClr val="dk1"/>
+          </a:lnRef>
+          <a:fillRef idx="0">
+            <a:schemeClr val="dk1"/>
+          </a:fillRef>
+          <a:effectRef idx="0">
+            <a:schemeClr val="dk1"/>
+          </a:effectRef>
+          <a:fontRef idx="minor">
+            <a:schemeClr val="tx1"/>
+          </a:fontRef>
+        </p:style>
+      </p:cxnSp>
+      <p:sp>
+        <p:nvSpPr>
+          <p:cNvPr id="26" name="TextBox 25">
+            <a:extLst>
+              <a:ext uri="{FF2B5EF4-FFF2-40B4-BE49-F238E27FC236}">
+                <a16:creationId xmlns:a16="http://schemas.microsoft.com/office/drawing/2014/main" id="{9A10B295-8AAF-4167-84E6-4FB314902016}"/>
+              </a:ext>
+            </a:extLst>
+          </p:cNvPr>
+          <p:cNvSpPr txBox="1"/>
+          <p:nvPr/>
+        </p:nvSpPr>
+        <p:spPr>
+          <a:xfrm>
+            <a:off x="3657600" y="4822521"/>
+            <a:ext cx="4581703" cy="923330"/>
+          </a:xfrm>
+          <a:prstGeom prst="rect">
+            <a:avLst/>
+          </a:prstGeom>
+          <a:noFill/>
+        </p:spPr>
+        <p:txBody>
+          <a:bodyPr wrap="none" rtlCol="0">
+            <a:spAutoFit/>
+          </a:bodyPr>
+          <a:lstStyle/>
+          <a:p>
+            <a:r>
+              <a:rPr lang="en-US" dirty="0"/>
+              <a:t>Receive the message (1024 bytes)</a:t>
+            </a:r>
+          </a:p>
+          <a:p>
+            <a:r>
+              <a:rPr lang="en-US" dirty="0"/>
+              <a:t>Decode the message into ascii readable output</a:t>
+            </a:r>
+          </a:p>
+          <a:p>
+            <a:r>
+              <a:rPr lang="en-US" dirty="0"/>
+              <a:t>Close the connection</a:t>
+            </a:r>
+          </a:p>
+        </p:txBody>
+      </p:sp>
+      <p:cxnSp>
+        <p:nvCxnSpPr>
+          <p:cNvPr id="28" name="Straight Arrow Connector 27">
+            <a:extLst>
+              <a:ext uri="{FF2B5EF4-FFF2-40B4-BE49-F238E27FC236}">
+                <a16:creationId xmlns:a16="http://schemas.microsoft.com/office/drawing/2014/main" id="{F76BC34C-6A10-4557-8BFC-35FC97FBF643}"/>
+              </a:ext>
+            </a:extLst>
+          </p:cNvPr>
+          <p:cNvCxnSpPr/>
+          <p:nvPr/>
+        </p:nvCxnSpPr>
+        <p:spPr>
+          <a:xfrm flipH="1" flipV="1">
+            <a:off x="1910849" y="4759890"/>
+            <a:ext cx="1759277" cy="250521"/>
+          </a:xfrm>
+          <a:prstGeom prst="straightConnector1">
+            <a:avLst/>
+          </a:prstGeom>
+          <a:ln>
+            <a:tailEnd type="triangle"/>
+          </a:ln>
+        </p:spPr>
+        <p:style>
+          <a:lnRef idx="1">
+            <a:schemeClr val="dk1"/>
+          </a:lnRef>
+          <a:fillRef idx="0">
+            <a:schemeClr val="dk1"/>
+          </a:fillRef>
+          <a:effectRef idx="0">
+            <a:schemeClr val="dk1"/>
+          </a:effectRef>
+          <a:fontRef idx="minor">
+            <a:schemeClr val="tx1"/>
+          </a:fontRef>
+        </p:style>
+      </p:cxnSp>
+      <p:cxnSp>
+        <p:nvCxnSpPr>
+          <p:cNvPr id="30" name="Straight Arrow Connector 29">
+            <a:extLst>
+              <a:ext uri="{FF2B5EF4-FFF2-40B4-BE49-F238E27FC236}">
+                <a16:creationId xmlns:a16="http://schemas.microsoft.com/office/drawing/2014/main" id="{EE711F33-805D-4D4D-81A1-E785931D09F8}"/>
+              </a:ext>
+            </a:extLst>
+          </p:cNvPr>
+          <p:cNvCxnSpPr>
+            <a:stCxn id="26" idx="1"/>
+            <a:endCxn id="11" idx="3"/>
+          </p:cNvCxnSpPr>
+          <p:nvPr/>
+        </p:nvCxnSpPr>
+        <p:spPr>
+          <a:xfrm flipH="1">
+            <a:off x="3017643" y="5284186"/>
+            <a:ext cx="639957" cy="63975"/>
+          </a:xfrm>
+          <a:prstGeom prst="straightConnector1">
+            <a:avLst/>
+          </a:prstGeom>
+          <a:ln>
+            <a:tailEnd type="triangle"/>
+          </a:ln>
+        </p:spPr>
+        <p:style>
+          <a:lnRef idx="1">
+            <a:schemeClr val="dk1"/>
+          </a:lnRef>
+          <a:fillRef idx="0">
+            <a:schemeClr val="dk1"/>
+          </a:fillRef>
+          <a:effectRef idx="0">
+            <a:schemeClr val="dk1"/>
+          </a:effectRef>
+          <a:fontRef idx="minor">
+            <a:schemeClr val="tx1"/>
+          </a:fontRef>
+        </p:style>
+      </p:cxnSp>
+      <p:cxnSp>
+        <p:nvCxnSpPr>
+          <p:cNvPr id="32" name="Straight Arrow Connector 31">
+            <a:extLst>
+              <a:ext uri="{FF2B5EF4-FFF2-40B4-BE49-F238E27FC236}">
+                <a16:creationId xmlns:a16="http://schemas.microsoft.com/office/drawing/2014/main" id="{ABB6F6B6-09A9-408A-877F-4D363D880B29}"/>
+              </a:ext>
+            </a:extLst>
+          </p:cNvPr>
+          <p:cNvCxnSpPr/>
+          <p:nvPr/>
+        </p:nvCxnSpPr>
+        <p:spPr>
+          <a:xfrm flipH="1">
+            <a:off x="1578279" y="5639371"/>
+            <a:ext cx="2091847" cy="116491"/>
+          </a:xfrm>
+          <a:prstGeom prst="straightConnector1">
+            <a:avLst/>
+          </a:prstGeom>
+          <a:ln>
+            <a:tailEnd type="triangle"/>
+          </a:ln>
+        </p:spPr>
+        <p:style>
+          <a:lnRef idx="1">
+            <a:schemeClr val="dk1"/>
+          </a:lnRef>
+          <a:fillRef idx="0">
+            <a:schemeClr val="dk1"/>
+          </a:fillRef>
+          <a:effectRef idx="0">
+            <a:schemeClr val="dk1"/>
+          </a:effectRef>
+          <a:fontRef idx="minor">
+            <a:schemeClr val="tx1"/>
+          </a:fontRef>
+        </p:style>
+      </p:cxnSp>
+    </p:spTree>
+    <p:extLst>
+      <p:ext uri="{BB962C8B-B14F-4D97-AF65-F5344CB8AC3E}">
+        <p14:creationId xmlns:p14="http://schemas.microsoft.com/office/powerpoint/2010/main" val="4229716910"/>
+      </p:ext>
+    </p:extLst>
+  </p:cSld>
+  <p:clrMapOvr>
+    <a:masterClrMapping/>
+  </p:clrMapOvr>
+</p:sld>
+</file>
+
 <file path=ppt/theme/theme1.xml><?xml version="1.0" encoding="utf-8"?>
 <a:theme xmlns:a="http://schemas.openxmlformats.org/drawingml/2006/main" name="Office Theme">
   <a:themeElements>

</xml_diff>